<commit_message>
week 1 Powerpoint Update
</commit_message>
<xml_diff>
--- a/week1/week1_install.pptx
+++ b/week1/week1_install.pptx
@@ -564,7 +564,7 @@
           <a:p>
             <a:fld id="{89347157-CD57-42FD-AB37-70B70B85F13E}" type="datetimeFigureOut">
               <a:rPr lang="en-US" smtClean="0"/>
-              <a:t>10/18/2025</a:t>
+              <a:t>10/23/2025</a:t>
             </a:fld>
             <a:endParaRPr lang="en-US"/>
           </a:p>
@@ -743,7 +743,7 @@
           <a:p>
             <a:fld id="{89347157-CD57-42FD-AB37-70B70B85F13E}" type="datetimeFigureOut">
               <a:rPr lang="en-US" smtClean="0"/>
-              <a:t>10/18/2025</a:t>
+              <a:t>10/23/2025</a:t>
             </a:fld>
             <a:endParaRPr lang="en-US"/>
           </a:p>
@@ -923,7 +923,7 @@
           <a:p>
             <a:fld id="{89347157-CD57-42FD-AB37-70B70B85F13E}" type="datetimeFigureOut">
               <a:rPr lang="en-US" smtClean="0"/>
-              <a:t>10/18/2025</a:t>
+              <a:t>10/23/2025</a:t>
             </a:fld>
             <a:endParaRPr lang="en-US"/>
           </a:p>
@@ -1093,7 +1093,7 @@
           <a:p>
             <a:fld id="{89347157-CD57-42FD-AB37-70B70B85F13E}" type="datetimeFigureOut">
               <a:rPr lang="en-US" smtClean="0"/>
-              <a:t>10/18/2025</a:t>
+              <a:t>10/23/2025</a:t>
             </a:fld>
             <a:endParaRPr lang="en-US"/>
           </a:p>
@@ -1413,7 +1413,7 @@
           <a:p>
             <a:fld id="{89347157-CD57-42FD-AB37-70B70B85F13E}" type="datetimeFigureOut">
               <a:rPr lang="en-US" smtClean="0"/>
-              <a:t>10/18/2025</a:t>
+              <a:t>10/23/2025</a:t>
             </a:fld>
             <a:endParaRPr lang="en-US"/>
           </a:p>
@@ -1813,7 +1813,7 @@
           <a:p>
             <a:fld id="{89347157-CD57-42FD-AB37-70B70B85F13E}" type="datetimeFigureOut">
               <a:rPr lang="en-US" smtClean="0"/>
-              <a:t>10/18/2025</a:t>
+              <a:t>10/23/2025</a:t>
             </a:fld>
             <a:endParaRPr lang="en-US"/>
           </a:p>
@@ -2247,7 +2247,7 @@
           <a:p>
             <a:fld id="{89347157-CD57-42FD-AB37-70B70B85F13E}" type="datetimeFigureOut">
               <a:rPr lang="en-US" smtClean="0"/>
-              <a:t>10/18/2025</a:t>
+              <a:t>10/23/2025</a:t>
             </a:fld>
             <a:endParaRPr lang="en-US"/>
           </a:p>
@@ -2365,7 +2365,7 @@
           <a:p>
             <a:fld id="{89347157-CD57-42FD-AB37-70B70B85F13E}" type="datetimeFigureOut">
               <a:rPr lang="en-US" smtClean="0"/>
-              <a:t>10/18/2025</a:t>
+              <a:t>10/23/2025</a:t>
             </a:fld>
             <a:endParaRPr lang="en-US"/>
           </a:p>
@@ -2460,7 +2460,7 @@
           <a:p>
             <a:fld id="{89347157-CD57-42FD-AB37-70B70B85F13E}" type="datetimeFigureOut">
               <a:rPr lang="en-US" smtClean="0"/>
-              <a:t>10/18/2025</a:t>
+              <a:t>10/23/2025</a:t>
             </a:fld>
             <a:endParaRPr lang="en-US"/>
           </a:p>
@@ -2817,7 +2817,7 @@
           <a:p>
             <a:fld id="{89347157-CD57-42FD-AB37-70B70B85F13E}" type="datetimeFigureOut">
               <a:rPr lang="en-US" smtClean="0"/>
-              <a:t>10/18/2025</a:t>
+              <a:t>10/23/2025</a:t>
             </a:fld>
             <a:endParaRPr lang="en-US"/>
           </a:p>
@@ -3263,7 +3263,7 @@
           <a:p>
             <a:fld id="{89347157-CD57-42FD-AB37-70B70B85F13E}" type="datetimeFigureOut">
               <a:rPr lang="en-US" smtClean="0"/>
-              <a:t>10/18/2025</a:t>
+              <a:t>10/23/2025</a:t>
             </a:fld>
             <a:endParaRPr lang="en-US"/>
           </a:p>
@@ -3558,7 +3558,7 @@
           <a:p>
             <a:fld id="{89347157-CD57-42FD-AB37-70B70B85F13E}" type="datetimeFigureOut">
               <a:rPr lang="en-US" smtClean="0"/>
-              <a:t>10/18/2025</a:t>
+              <a:t>10/23/2025</a:t>
             </a:fld>
             <a:endParaRPr lang="en-US"/>
           </a:p>
@@ -5912,7 +5912,7 @@
           <a:p>
             <a:r>
               <a:rPr lang="en-US" dirty="0"/>
-              <a:t>Download WSL</a:t>
+              <a:t>Download WSL (Windows 11)</a:t>
             </a:r>
           </a:p>
         </p:txBody>
@@ -5943,7 +5943,16 @@
             </a:pPr>
             <a:r>
               <a:rPr lang="en-US" dirty="0"/>
-              <a:t>For Windows 11:</a:t>
+              <a:t>Find the settings “Turn Windows features on or off”</a:t>
+            </a:r>
+          </a:p>
+          <a:p>
+            <a:pPr marL="0" indent="0">
+              <a:buNone/>
+            </a:pPr>
+            <a:r>
+              <a:rPr lang="en-US" dirty="0"/>
+              <a:t>Make Sure “Windows Subsystem for Linux” is enabled</a:t>
             </a:r>
           </a:p>
           <a:p>
@@ -6005,21 +6014,6 @@
               <a:t> 2 on your computer with ubuntu (default)</a:t>
             </a:r>
             <a:endParaRPr lang="en-US" dirty="0"/>
-          </a:p>
-          <a:p>
-            <a:pPr marL="0" indent="0">
-              <a:buNone/>
-            </a:pPr>
-            <a:endParaRPr lang="en-US" dirty="0"/>
-          </a:p>
-          <a:p>
-            <a:pPr marL="0" indent="0">
-              <a:buNone/>
-            </a:pPr>
-            <a:r>
-              <a:rPr lang="en-US" dirty="0"/>
-              <a:t>If you run another version of Windows, figure it out.</a:t>
-            </a:r>
           </a:p>
         </p:txBody>
       </p:sp>

</xml_diff>

<commit_message>
update ppt and week 2 code
</commit_message>
<xml_diff>
--- a/week1/week1_install.pptx
+++ b/week1/week1_install.pptx
@@ -564,7 +564,7 @@
           <a:p>
             <a:fld id="{89347157-CD57-42FD-AB37-70B70B85F13E}" type="datetimeFigureOut">
               <a:rPr lang="en-US" smtClean="0"/>
-              <a:t>10/23/2025</a:t>
+              <a:t>10/29/2025</a:t>
             </a:fld>
             <a:endParaRPr lang="en-US"/>
           </a:p>
@@ -743,7 +743,7 @@
           <a:p>
             <a:fld id="{89347157-CD57-42FD-AB37-70B70B85F13E}" type="datetimeFigureOut">
               <a:rPr lang="en-US" smtClean="0"/>
-              <a:t>10/23/2025</a:t>
+              <a:t>10/29/2025</a:t>
             </a:fld>
             <a:endParaRPr lang="en-US"/>
           </a:p>
@@ -923,7 +923,7 @@
           <a:p>
             <a:fld id="{89347157-CD57-42FD-AB37-70B70B85F13E}" type="datetimeFigureOut">
               <a:rPr lang="en-US" smtClean="0"/>
-              <a:t>10/23/2025</a:t>
+              <a:t>10/29/2025</a:t>
             </a:fld>
             <a:endParaRPr lang="en-US"/>
           </a:p>
@@ -1093,7 +1093,7 @@
           <a:p>
             <a:fld id="{89347157-CD57-42FD-AB37-70B70B85F13E}" type="datetimeFigureOut">
               <a:rPr lang="en-US" smtClean="0"/>
-              <a:t>10/23/2025</a:t>
+              <a:t>10/29/2025</a:t>
             </a:fld>
             <a:endParaRPr lang="en-US"/>
           </a:p>
@@ -1413,7 +1413,7 @@
           <a:p>
             <a:fld id="{89347157-CD57-42FD-AB37-70B70B85F13E}" type="datetimeFigureOut">
               <a:rPr lang="en-US" smtClean="0"/>
-              <a:t>10/23/2025</a:t>
+              <a:t>10/29/2025</a:t>
             </a:fld>
             <a:endParaRPr lang="en-US"/>
           </a:p>
@@ -1813,7 +1813,7 @@
           <a:p>
             <a:fld id="{89347157-CD57-42FD-AB37-70B70B85F13E}" type="datetimeFigureOut">
               <a:rPr lang="en-US" smtClean="0"/>
-              <a:t>10/23/2025</a:t>
+              <a:t>10/29/2025</a:t>
             </a:fld>
             <a:endParaRPr lang="en-US"/>
           </a:p>
@@ -2247,7 +2247,7 @@
           <a:p>
             <a:fld id="{89347157-CD57-42FD-AB37-70B70B85F13E}" type="datetimeFigureOut">
               <a:rPr lang="en-US" smtClean="0"/>
-              <a:t>10/23/2025</a:t>
+              <a:t>10/29/2025</a:t>
             </a:fld>
             <a:endParaRPr lang="en-US"/>
           </a:p>
@@ -2365,7 +2365,7 @@
           <a:p>
             <a:fld id="{89347157-CD57-42FD-AB37-70B70B85F13E}" type="datetimeFigureOut">
               <a:rPr lang="en-US" smtClean="0"/>
-              <a:t>10/23/2025</a:t>
+              <a:t>10/29/2025</a:t>
             </a:fld>
             <a:endParaRPr lang="en-US"/>
           </a:p>
@@ -2460,7 +2460,7 @@
           <a:p>
             <a:fld id="{89347157-CD57-42FD-AB37-70B70B85F13E}" type="datetimeFigureOut">
               <a:rPr lang="en-US" smtClean="0"/>
-              <a:t>10/23/2025</a:t>
+              <a:t>10/29/2025</a:t>
             </a:fld>
             <a:endParaRPr lang="en-US"/>
           </a:p>
@@ -2817,7 +2817,7 @@
           <a:p>
             <a:fld id="{89347157-CD57-42FD-AB37-70B70B85F13E}" type="datetimeFigureOut">
               <a:rPr lang="en-US" smtClean="0"/>
-              <a:t>10/23/2025</a:t>
+              <a:t>10/29/2025</a:t>
             </a:fld>
             <a:endParaRPr lang="en-US"/>
           </a:p>
@@ -3263,7 +3263,7 @@
           <a:p>
             <a:fld id="{89347157-CD57-42FD-AB37-70B70B85F13E}" type="datetimeFigureOut">
               <a:rPr lang="en-US" smtClean="0"/>
-              <a:t>10/23/2025</a:t>
+              <a:t>10/29/2025</a:t>
             </a:fld>
             <a:endParaRPr lang="en-US"/>
           </a:p>
@@ -3558,7 +3558,7 @@
           <a:p>
             <a:fld id="{89347157-CD57-42FD-AB37-70B70B85F13E}" type="datetimeFigureOut">
               <a:rPr lang="en-US" smtClean="0"/>
-              <a:t>10/23/2025</a:t>
+              <a:t>10/29/2025</a:t>
             </a:fld>
             <a:endParaRPr lang="en-US"/>
           </a:p>
@@ -5071,43 +5071,7 @@
               <a:rPr lang="en-US" dirty="0">
                 <a:sym typeface="Wingdings" panose="05000000000000000000" pitchFamily="2" charset="2"/>
               </a:rPr>
-              <a:t> instance running on your windows side it sometimes gets mixed up. If needed close the windows instance and </a:t>
-            </a:r>
-            <a:r>
-              <a:rPr lang="en-US" dirty="0" err="1">
-                <a:sym typeface="Wingdings" panose="05000000000000000000" pitchFamily="2" charset="2"/>
-              </a:rPr>
-              <a:t>and</a:t>
-            </a:r>
-            <a:r>
-              <a:rPr lang="en-US" dirty="0">
-                <a:sym typeface="Wingdings" panose="05000000000000000000" pitchFamily="2" charset="2"/>
-              </a:rPr>
-              <a:t> </a:t>
-            </a:r>
-            <a:r>
-              <a:rPr lang="en-US" dirty="0" err="1">
-                <a:sym typeface="Wingdings" panose="05000000000000000000" pitchFamily="2" charset="2"/>
-              </a:rPr>
-              <a:t>linux</a:t>
-            </a:r>
-            <a:r>
-              <a:rPr lang="en-US" dirty="0">
-                <a:sym typeface="Wingdings" panose="05000000000000000000" pitchFamily="2" charset="2"/>
-              </a:rPr>
-              <a:t> case and rerun the </a:t>
-            </a:r>
-            <a:r>
-              <a:rPr lang="en-US" dirty="0" err="1">
-                <a:sym typeface="Wingdings" panose="05000000000000000000" pitchFamily="2" charset="2"/>
-              </a:rPr>
-              <a:t>linux</a:t>
-            </a:r>
-            <a:r>
-              <a:rPr lang="en-US" dirty="0">
-                <a:sym typeface="Wingdings" panose="05000000000000000000" pitchFamily="2" charset="2"/>
-              </a:rPr>
-              <a:t> case</a:t>
+              <a:t> instance running on your windows side it sometimes gets mixed up. If needed add the flag --port 9999 (or some other port so it doesn’t conflict)</a:t>
             </a:r>
             <a:endParaRPr lang="en-US" dirty="0"/>
           </a:p>
@@ -5639,12 +5603,36 @@
         </p:nvSpPr>
         <p:spPr/>
         <p:txBody>
-          <a:bodyPr/>
+          <a:bodyPr>
+            <a:normAutofit fontScale="85000" lnSpcReduction="10000"/>
+          </a:bodyPr>
           <a:lstStyle/>
           <a:p>
             <a:r>
               <a:rPr lang="en-US" dirty="0"/>
               <a:t>Week 1 – Installation</a:t>
+            </a:r>
+          </a:p>
+          <a:p>
+            <a:r>
+              <a:rPr lang="en-US" dirty="0"/>
+              <a:t>*note: some of the “-” characters are rendering as </a:t>
+            </a:r>
+            <a:r>
+              <a:rPr lang="en-US" dirty="0" err="1"/>
+              <a:t>em</a:t>
+            </a:r>
+            <a:r>
+              <a:rPr lang="en-US" dirty="0"/>
+              <a:t> dashes instead of </a:t>
+            </a:r>
+            <a:r>
+              <a:rPr lang="en-US" dirty="0" err="1"/>
+              <a:t>en</a:t>
+            </a:r>
+            <a:r>
+              <a:rPr lang="en-US" dirty="0"/>
+              <a:t> dashes, so beware of that when copying from this presentation</a:t>
             </a:r>
           </a:p>
           <a:p>

</xml_diff>